<commit_message>
Fin documentacion anaconda y jupyter lab
</commit_message>
<xml_diff>
--- a/0_Ramp_Up/documentos/Data Science - Ramp Up - Apoyo.pptx
+++ b/0_Ramp_Up/documentos/Data Science - Ramp Up - Apoyo.pptx
@@ -4697,7 +4697,7 @@
         </p:spPr>
         <p:txBody>
           <a:bodyPr>
-            <a:normAutofit/>
+            <a:normAutofit fontScale="92500"/>
           </a:bodyPr>
           <a:lstStyle/>
           <a:p>
@@ -4740,6 +4740,20 @@
               <a:t>stackoverflow</a:t>
             </a:r>
             <a:endParaRPr lang="es-ES" sz="2400" b="1" u="sng" dirty="0"/>
+          </a:p>
+          <a:p>
+            <a:r>
+              <a:rPr lang="es-ES" sz="2400" dirty="0"/>
+              <a:t>Copiar el error y pegarlo en Google en ocasiones funciona. Mucha gente que escribe en </a:t>
+            </a:r>
+            <a:r>
+              <a:rPr lang="es-ES" sz="2400" dirty="0" err="1"/>
+              <a:t>stackoverflow</a:t>
+            </a:r>
+            <a:r>
+              <a:rPr lang="es-ES" sz="2400" dirty="0"/>
+              <a:t>, pega el error entero también.</a:t>
+            </a:r>
           </a:p>
         </p:txBody>
       </p:sp>

</xml_diff>

<commit_message>
cambios clase dia 3, semana 1
</commit_message>
<xml_diff>
--- a/0_Ramp_Up/documentos/Data Science - Ramp Up - Apoyo.pptx
+++ b/0_Ramp_Up/documentos/Data Science - Ramp Up - Apoyo.pptx
@@ -5,17 +5,18 @@
     <p:sldMasterId id="2147483660" r:id="rId1"/>
   </p:sldMasterIdLst>
   <p:notesMasterIdLst>
-    <p:notesMasterId r:id="rId7"/>
+    <p:notesMasterId r:id="rId8"/>
   </p:notesMasterIdLst>
   <p:handoutMasterIdLst>
-    <p:handoutMasterId r:id="rId8"/>
+    <p:handoutMasterId r:id="rId9"/>
   </p:handoutMasterIdLst>
   <p:sldIdLst>
     <p:sldId id="256" r:id="rId2"/>
     <p:sldId id="263" r:id="rId3"/>
     <p:sldId id="265" r:id="rId4"/>
     <p:sldId id="266" r:id="rId5"/>
-    <p:sldId id="264" r:id="rId6"/>
+    <p:sldId id="267" r:id="rId6"/>
+    <p:sldId id="264" r:id="rId7"/>
   </p:sldIdLst>
   <p:sldSz cx="12192000" cy="6858000"/>
   <p:notesSz cx="6858000" cy="9144000"/>
@@ -219,7 +220,7 @@
           <a:p>
             <a:fld id="{E2E1EB10-6A21-440E-BF2D-F14C49559F2A}" type="datetimeFigureOut">
               <a:rPr lang="es-ES" smtClean="0"/>
-              <a:t>14/06/2020</a:t>
+              <a:t>19/06/2020</a:t>
             </a:fld>
             <a:endParaRPr lang="es-ES"/>
           </a:p>
@@ -403,7 +404,7 @@
           <a:p>
             <a:fld id="{6030B40B-5C5C-408D-8E71-442557AE69BE}" type="datetimeFigureOut">
               <a:rPr lang="es-ES" smtClean="0"/>
-              <a:t>14/06/2020</a:t>
+              <a:t>19/06/2020</a:t>
             </a:fld>
             <a:endParaRPr lang="es-ES"/>
           </a:p>
@@ -805,7 +806,7 @@
           <a:p>
             <a:fld id="{5B772F0D-A02A-4702-8780-0B9BEC7A8699}" type="datetime1">
               <a:rPr lang="es-ES" smtClean="0"/>
-              <a:t>14/06/2020</a:t>
+              <a:t>19/06/2020</a:t>
             </a:fld>
             <a:endParaRPr lang="es-ES"/>
           </a:p>
@@ -978,7 +979,7 @@
           <a:p>
             <a:fld id="{B7089A12-8DCA-43F2-8141-5440FE76067E}" type="datetime1">
               <a:rPr lang="es-ES" smtClean="0"/>
-              <a:t>14/06/2020</a:t>
+              <a:t>19/06/2020</a:t>
             </a:fld>
             <a:endParaRPr lang="es-ES"/>
           </a:p>
@@ -1161,7 +1162,7 @@
           <a:p>
             <a:fld id="{1ECAA92C-77A8-40E9-B836-7A7337601971}" type="datetime1">
               <a:rPr lang="es-ES" smtClean="0"/>
-              <a:t>14/06/2020</a:t>
+              <a:t>19/06/2020</a:t>
             </a:fld>
             <a:endParaRPr lang="es-ES"/>
           </a:p>
@@ -1334,7 +1335,7 @@
           <a:p>
             <a:fld id="{76C3C7A2-BAD2-4CA0-B88A-B6452E90DFBC}" type="datetime1">
               <a:rPr lang="es-ES" smtClean="0"/>
-              <a:t>14/06/2020</a:t>
+              <a:t>19/06/2020</a:t>
             </a:fld>
             <a:endParaRPr lang="es-ES"/>
           </a:p>
@@ -1583,7 +1584,7 @@
           <a:p>
             <a:fld id="{ECA9CF60-F39A-43C0-966A-9235067209B8}" type="datetime1">
               <a:rPr lang="es-ES" smtClean="0"/>
-              <a:t>14/06/2020</a:t>
+              <a:t>19/06/2020</a:t>
             </a:fld>
             <a:endParaRPr lang="es-ES"/>
           </a:p>
@@ -1818,7 +1819,7 @@
           <a:p>
             <a:fld id="{4956C9BF-599C-46EE-897D-D3B566742584}" type="datetime1">
               <a:rPr lang="es-ES" smtClean="0"/>
-              <a:t>14/06/2020</a:t>
+              <a:t>19/06/2020</a:t>
             </a:fld>
             <a:endParaRPr lang="es-ES"/>
           </a:p>
@@ -2188,7 +2189,7 @@
           <a:p>
             <a:fld id="{95FE9576-1C9C-4DA4-A00A-9DD8D8245248}" type="datetime1">
               <a:rPr lang="es-ES" smtClean="0"/>
-              <a:t>14/06/2020</a:t>
+              <a:t>19/06/2020</a:t>
             </a:fld>
             <a:endParaRPr lang="es-ES"/>
           </a:p>
@@ -2309,7 +2310,7 @@
           <a:p>
             <a:fld id="{A25E806F-9BD2-4ABB-A643-CD5EC8F2EFC5}" type="datetime1">
               <a:rPr lang="es-ES" smtClean="0"/>
-              <a:t>14/06/2020</a:t>
+              <a:t>19/06/2020</a:t>
             </a:fld>
             <a:endParaRPr lang="es-ES"/>
           </a:p>
@@ -2407,7 +2408,7 @@
           <a:p>
             <a:fld id="{44D58291-17CD-4DFA-B627-8197516A579F}" type="datetime1">
               <a:rPr lang="es-ES" smtClean="0"/>
-              <a:t>14/06/2020</a:t>
+              <a:t>19/06/2020</a:t>
             </a:fld>
             <a:endParaRPr lang="es-ES"/>
           </a:p>
@@ -2687,7 +2688,7 @@
           <a:p>
             <a:fld id="{CE47F85A-B433-4D20-98A1-4063FF1FEBAE}" type="datetime1">
               <a:rPr lang="es-ES" smtClean="0"/>
-              <a:t>14/06/2020</a:t>
+              <a:t>19/06/2020</a:t>
             </a:fld>
             <a:endParaRPr lang="es-ES"/>
           </a:p>
@@ -2947,7 +2948,7 @@
           <a:p>
             <a:fld id="{88FF7EC7-7A16-44B9-9DAF-6069C283BDDE}" type="datetime1">
               <a:rPr lang="es-ES" smtClean="0"/>
-              <a:t>14/06/2020</a:t>
+              <a:t>19/06/2020</a:t>
             </a:fld>
             <a:endParaRPr lang="es-ES"/>
           </a:p>
@@ -3163,7 +3164,7 @@
           <a:p>
             <a:fld id="{1FF7DE26-E335-45E6-BFEF-90CB33A4197F}" type="datetime1">
               <a:rPr lang="es-ES" smtClean="0"/>
-              <a:t>14/06/2020</a:t>
+              <a:t>19/06/2020</a:t>
             </a:fld>
             <a:endParaRPr lang="es-ES"/>
           </a:p>
@@ -4991,6 +4992,132 @@
 </file>
 
 <file path=ppt/slides/slide5.xml><?xml version="1.0" encoding="utf-8"?>
+<p:sld xmlns:a="http://schemas.openxmlformats.org/drawingml/2006/main" xmlns:r="http://schemas.openxmlformats.org/officeDocument/2006/relationships" xmlns:p="http://schemas.openxmlformats.org/presentationml/2006/main">
+  <p:cSld>
+    <p:spTree>
+      <p:nvGrpSpPr>
+        <p:cNvPr id="1" name=""/>
+        <p:cNvGrpSpPr/>
+        <p:nvPr/>
+      </p:nvGrpSpPr>
+      <p:grpSpPr>
+        <a:xfrm>
+          <a:off x="0" y="0"/>
+          <a:ext cx="0" cy="0"/>
+          <a:chOff x="0" y="0"/>
+          <a:chExt cx="0" cy="0"/>
+        </a:xfrm>
+      </p:grpSpPr>
+      <p:sp>
+        <p:nvSpPr>
+          <p:cNvPr id="3" name="Marcador de contenido 2">
+            <a:extLst>
+              <a:ext uri="{FF2B5EF4-FFF2-40B4-BE49-F238E27FC236}">
+                <a16:creationId xmlns:a16="http://schemas.microsoft.com/office/drawing/2014/main" id="{4A75A277-946E-4125-BC1B-9BA66C0ACE8F}"/>
+              </a:ext>
+            </a:extLst>
+          </p:cNvPr>
+          <p:cNvSpPr>
+            <a:spLocks noGrp="1"/>
+          </p:cNvSpPr>
+          <p:nvPr>
+            <p:ph idx="1"/>
+          </p:nvPr>
+        </p:nvSpPr>
+        <p:spPr>
+          <a:xfrm>
+            <a:off x="542346" y="940142"/>
+            <a:ext cx="9836649" cy="777027"/>
+          </a:xfrm>
+        </p:spPr>
+        <p:txBody>
+          <a:bodyPr/>
+          <a:lstStyle/>
+          <a:p>
+            <a:pPr marL="0" indent="0">
+              <a:buNone/>
+            </a:pPr>
+            <a:r>
+              <a:rPr lang="es-ES" dirty="0"/>
+              <a:t>Consultar documentación</a:t>
+            </a:r>
+          </a:p>
+        </p:txBody>
+      </p:sp>
+      <p:pic>
+        <p:nvPicPr>
+          <p:cNvPr id="9" name="Imagen 8">
+            <a:extLst>
+              <a:ext uri="{FF2B5EF4-FFF2-40B4-BE49-F238E27FC236}">
+                <a16:creationId xmlns:a16="http://schemas.microsoft.com/office/drawing/2014/main" id="{EBF4223A-390F-41E4-9EFD-486D1A05C68E}"/>
+              </a:ext>
+            </a:extLst>
+          </p:cNvPr>
+          <p:cNvPicPr>
+            <a:picLocks noChangeAspect="1"/>
+          </p:cNvPicPr>
+          <p:nvPr/>
+        </p:nvPicPr>
+        <p:blipFill>
+          <a:blip r:embed="rId2"/>
+          <a:stretch>
+            <a:fillRect/>
+          </a:stretch>
+        </p:blipFill>
+        <p:spPr>
+          <a:xfrm>
+            <a:off x="542346" y="1781807"/>
+            <a:ext cx="5215895" cy="2454291"/>
+          </a:xfrm>
+          <a:prstGeom prst="rect">
+            <a:avLst/>
+          </a:prstGeom>
+        </p:spPr>
+      </p:pic>
+      <p:pic>
+        <p:nvPicPr>
+          <p:cNvPr id="10" name="Imagen 9">
+            <a:extLst>
+              <a:ext uri="{FF2B5EF4-FFF2-40B4-BE49-F238E27FC236}">
+                <a16:creationId xmlns:a16="http://schemas.microsoft.com/office/drawing/2014/main" id="{4954CA7F-3812-4903-B251-DDAF6BC219C1}"/>
+              </a:ext>
+            </a:extLst>
+          </p:cNvPr>
+          <p:cNvPicPr>
+            <a:picLocks noChangeAspect="1"/>
+          </p:cNvPicPr>
+          <p:nvPr/>
+        </p:nvPicPr>
+        <p:blipFill>
+          <a:blip r:embed="rId3"/>
+          <a:stretch>
+            <a:fillRect/>
+          </a:stretch>
+        </p:blipFill>
+        <p:spPr>
+          <a:xfrm>
+            <a:off x="5963521" y="1781807"/>
+            <a:ext cx="5686133" cy="2726968"/>
+          </a:xfrm>
+          <a:prstGeom prst="rect">
+            <a:avLst/>
+          </a:prstGeom>
+        </p:spPr>
+      </p:pic>
+    </p:spTree>
+    <p:extLst>
+      <p:ext uri="{BB962C8B-B14F-4D97-AF65-F5344CB8AC3E}">
+        <p14:creationId xmlns:p14="http://schemas.microsoft.com/office/powerpoint/2010/main" val="1734767520"/>
+      </p:ext>
+    </p:extLst>
+  </p:cSld>
+  <p:clrMapOvr>
+    <a:masterClrMapping/>
+  </p:clrMapOvr>
+</p:sld>
+</file>
+
+<file path=ppt/slides/slide6.xml><?xml version="1.0" encoding="utf-8"?>
 <p:sld xmlns:a="http://schemas.openxmlformats.org/drawingml/2006/main" xmlns:r="http://schemas.openxmlformats.org/officeDocument/2006/relationships" xmlns:p="http://schemas.openxmlformats.org/presentationml/2006/main">
   <p:cSld>
     <p:spTree>

</xml_diff>